<commit_message>
Project EDA first release
</commit_message>
<xml_diff>
--- a/documentation/DVG_Presentation.pptx
+++ b/documentation/DVG_Presentation.pptx
@@ -8,22 +8,21 @@
     <p:sldId id="256" r:id="rId2"/>
     <p:sldId id="257" r:id="rId3"/>
     <p:sldId id="258" r:id="rId4"/>
-    <p:sldId id="260" r:id="rId5"/>
-    <p:sldId id="266" r:id="rId6"/>
-    <p:sldId id="267" r:id="rId7"/>
-    <p:sldId id="272" r:id="rId8"/>
-    <p:sldId id="259" r:id="rId9"/>
-    <p:sldId id="268" r:id="rId10"/>
-    <p:sldId id="269" r:id="rId11"/>
-    <p:sldId id="270" r:id="rId12"/>
-    <p:sldId id="261" r:id="rId13"/>
-    <p:sldId id="273" r:id="rId14"/>
-    <p:sldId id="274" r:id="rId15"/>
-    <p:sldId id="262" r:id="rId16"/>
-    <p:sldId id="263" r:id="rId17"/>
+    <p:sldId id="263" r:id="rId5"/>
+    <p:sldId id="260" r:id="rId6"/>
+    <p:sldId id="266" r:id="rId7"/>
+    <p:sldId id="267" r:id="rId8"/>
+    <p:sldId id="272" r:id="rId9"/>
+    <p:sldId id="259" r:id="rId10"/>
+    <p:sldId id="268" r:id="rId11"/>
+    <p:sldId id="269" r:id="rId12"/>
+    <p:sldId id="270" r:id="rId13"/>
+    <p:sldId id="261" r:id="rId14"/>
+    <p:sldId id="273" r:id="rId15"/>
+    <p:sldId id="274" r:id="rId16"/>
+    <p:sldId id="262" r:id="rId17"/>
     <p:sldId id="264" r:id="rId18"/>
-    <p:sldId id="275" r:id="rId19"/>
-    <p:sldId id="265" r:id="rId20"/>
+    <p:sldId id="265" r:id="rId19"/>
   </p:sldIdLst>
   <p:sldSz cx="12192000" cy="6858000"/>
   <p:notesSz cx="6858000" cy="9144000"/>
@@ -319,7 +318,7 @@
             <a:fld id="{B61BEF0D-F0BB-DE4B-95CE-6DB70DBA9567}" type="datetimeFigureOut">
               <a:rPr lang="en-US" dirty="0"/>
               <a:pPr/>
-              <a:t>1/11/2021</a:t>
+              <a:t>1/13/2021</a:t>
             </a:fld>
             <a:endParaRPr lang="en-US" dirty="0"/>
           </a:p>
@@ -654,7 +653,7 @@
             <a:fld id="{B61BEF0D-F0BB-DE4B-95CE-6DB70DBA9567}" type="datetimeFigureOut">
               <a:rPr lang="en-US" dirty="0"/>
               <a:pPr/>
-              <a:t>1/11/2021</a:t>
+              <a:t>1/13/2021</a:t>
             </a:fld>
             <a:endParaRPr lang="en-US" dirty="0"/>
           </a:p>
@@ -1052,7 +1051,7 @@
             <a:fld id="{B61BEF0D-F0BB-DE4B-95CE-6DB70DBA9567}" type="datetimeFigureOut">
               <a:rPr lang="en-US" dirty="0"/>
               <a:pPr/>
-              <a:t>1/11/2021</a:t>
+              <a:t>1/13/2021</a:t>
             </a:fld>
             <a:endParaRPr lang="en-US" dirty="0"/>
           </a:p>
@@ -1385,7 +1384,7 @@
             <a:fld id="{B61BEF0D-F0BB-DE4B-95CE-6DB70DBA9567}" type="datetimeFigureOut">
               <a:rPr lang="en-US" dirty="0"/>
               <a:pPr/>
-              <a:t>1/11/2021</a:t>
+              <a:t>1/13/2021</a:t>
             </a:fld>
             <a:endParaRPr lang="en-US" dirty="0"/>
           </a:p>
@@ -1702,7 +1701,7 @@
             <a:fld id="{B61BEF0D-F0BB-DE4B-95CE-6DB70DBA9567}" type="datetimeFigureOut">
               <a:rPr lang="en-US" dirty="0"/>
               <a:pPr/>
-              <a:t>1/11/2021</a:t>
+              <a:t>1/13/2021</a:t>
             </a:fld>
             <a:endParaRPr lang="en-US" dirty="0"/>
           </a:p>
@@ -2095,7 +2094,7 @@
             <a:fld id="{B61BEF0D-F0BB-DE4B-95CE-6DB70DBA9567}" type="datetimeFigureOut">
               <a:rPr lang="en-US" dirty="0"/>
               <a:pPr/>
-              <a:t>1/11/2021</a:t>
+              <a:t>1/13/2021</a:t>
             </a:fld>
             <a:endParaRPr lang="en-US" dirty="0"/>
           </a:p>
@@ -2349,7 +2348,7 @@
             <a:fld id="{B61BEF0D-F0BB-DE4B-95CE-6DB70DBA9567}" type="datetimeFigureOut">
               <a:rPr lang="en-US" dirty="0"/>
               <a:pPr/>
-              <a:t>1/11/2021</a:t>
+              <a:t>1/13/2021</a:t>
             </a:fld>
             <a:endParaRPr lang="en-US" dirty="0"/>
           </a:p>
@@ -2608,7 +2607,7 @@
             <a:fld id="{B61BEF0D-F0BB-DE4B-95CE-6DB70DBA9567}" type="datetimeFigureOut">
               <a:rPr lang="en-US" dirty="0"/>
               <a:pPr/>
-              <a:t>1/11/2021</a:t>
+              <a:t>1/13/2021</a:t>
             </a:fld>
             <a:endParaRPr lang="en-US" dirty="0"/>
           </a:p>
@@ -2867,7 +2866,7 @@
             <a:fld id="{B61BEF0D-F0BB-DE4B-95CE-6DB70DBA9567}" type="datetimeFigureOut">
               <a:rPr lang="en-US" dirty="0"/>
               <a:pPr/>
-              <a:t>1/11/2021</a:t>
+              <a:t>1/13/2021</a:t>
             </a:fld>
             <a:endParaRPr lang="en-US" dirty="0"/>
           </a:p>
@@ -3193,7 +3192,7 @@
             <a:fld id="{B61BEF0D-F0BB-DE4B-95CE-6DB70DBA9567}" type="datetimeFigureOut">
               <a:rPr lang="en-US" dirty="0"/>
               <a:pPr/>
-              <a:t>1/11/2021</a:t>
+              <a:t>1/13/2021</a:t>
             </a:fld>
             <a:endParaRPr lang="en-US" dirty="0"/>
           </a:p>
@@ -3513,7 +3512,7 @@
             <a:fld id="{B61BEF0D-F0BB-DE4B-95CE-6DB70DBA9567}" type="datetimeFigureOut">
               <a:rPr lang="en-US" dirty="0"/>
               <a:pPr/>
-              <a:t>1/11/2021</a:t>
+              <a:t>1/13/2021</a:t>
             </a:fld>
             <a:endParaRPr lang="en-US" dirty="0"/>
           </a:p>
@@ -3967,7 +3966,7 @@
             <a:fld id="{B61BEF0D-F0BB-DE4B-95CE-6DB70DBA9567}" type="datetimeFigureOut">
               <a:rPr lang="en-US" dirty="0"/>
               <a:pPr/>
-              <a:t>1/11/2021</a:t>
+              <a:t>1/13/2021</a:t>
             </a:fld>
             <a:endParaRPr lang="en-US" dirty="0"/>
           </a:p>
@@ -4169,7 +4168,7 @@
             <a:fld id="{B61BEF0D-F0BB-DE4B-95CE-6DB70DBA9567}" type="datetimeFigureOut">
               <a:rPr lang="en-US" dirty="0"/>
               <a:pPr/>
-              <a:t>1/11/2021</a:t>
+              <a:t>1/13/2021</a:t>
             </a:fld>
             <a:endParaRPr lang="en-US" dirty="0"/>
           </a:p>
@@ -4343,7 +4342,7 @@
             <a:fld id="{B61BEF0D-F0BB-DE4B-95CE-6DB70DBA9567}" type="datetimeFigureOut">
               <a:rPr lang="en-US" dirty="0"/>
               <a:pPr/>
-              <a:t>1/11/2021</a:t>
+              <a:t>1/13/2021</a:t>
             </a:fld>
             <a:endParaRPr lang="en-US" dirty="0"/>
           </a:p>
@@ -4673,7 +4672,7 @@
             <a:fld id="{B61BEF0D-F0BB-DE4B-95CE-6DB70DBA9567}" type="datetimeFigureOut">
               <a:rPr lang="en-US" dirty="0"/>
               <a:pPr/>
-              <a:t>1/11/2021</a:t>
+              <a:t>1/13/2021</a:t>
             </a:fld>
             <a:endParaRPr lang="en-US" dirty="0"/>
           </a:p>
@@ -5015,7 +5014,7 @@
             <a:fld id="{B61BEF0D-F0BB-DE4B-95CE-6DB70DBA9567}" type="datetimeFigureOut">
               <a:rPr lang="en-US" dirty="0"/>
               <a:pPr/>
-              <a:t>1/11/2021</a:t>
+              <a:t>1/13/2021</a:t>
             </a:fld>
             <a:endParaRPr lang="en-US" dirty="0"/>
           </a:p>
@@ -7129,7 +7128,7 @@
             <a:fld id="{B61BEF0D-F0BB-DE4B-95CE-6DB70DBA9567}" type="datetimeFigureOut">
               <a:rPr lang="en-US" dirty="0"/>
               <a:pPr/>
-              <a:t>1/11/2021</a:t>
+              <a:t>1/13/2021</a:t>
             </a:fld>
             <a:endParaRPr lang="en-US" dirty="0"/>
           </a:p>
@@ -7795,6 +7794,98 @@
           <a:chExt cx="0" cy="0"/>
         </a:xfrm>
       </p:grpSpPr>
+      <p:sp>
+        <p:nvSpPr>
+          <p:cNvPr id="2" name="Título 1">
+            <a:extLst>
+              <a:ext uri="{FF2B5EF4-FFF2-40B4-BE49-F238E27FC236}">
+                <a16:creationId xmlns:a16="http://schemas.microsoft.com/office/drawing/2014/main" id="{C4F6810E-6088-456B-AC40-E826204B452B}"/>
+              </a:ext>
+            </a:extLst>
+          </p:cNvPr>
+          <p:cNvSpPr>
+            <a:spLocks noGrp="1"/>
+          </p:cNvSpPr>
+          <p:nvPr>
+            <p:ph type="title"/>
+          </p:nvPr>
+        </p:nvSpPr>
+        <p:spPr/>
+        <p:txBody>
+          <a:bodyPr/>
+          <a:lstStyle/>
+          <a:p>
+            <a:endParaRPr lang="es-ES" dirty="0"/>
+          </a:p>
+        </p:txBody>
+      </p:sp>
+      <p:pic>
+        <p:nvPicPr>
+          <p:cNvPr id="6" name="Marcador de contenido 5" descr="Gráfico, Histograma&#10;&#10;Descripción generada automáticamente">
+            <a:extLst>
+              <a:ext uri="{FF2B5EF4-FFF2-40B4-BE49-F238E27FC236}">
+                <a16:creationId xmlns:a16="http://schemas.microsoft.com/office/drawing/2014/main" id="{3C96AF1D-4473-4E02-B1C0-962861C62FF1}"/>
+              </a:ext>
+            </a:extLst>
+          </p:cNvPr>
+          <p:cNvPicPr>
+            <a:picLocks noGrp="1" noChangeAspect="1"/>
+          </p:cNvPicPr>
+          <p:nvPr>
+            <p:ph idx="1"/>
+          </p:nvPr>
+        </p:nvPicPr>
+        <p:blipFill>
+          <a:blip r:embed="rId2"/>
+          <a:stretch>
+            <a:fillRect/>
+          </a:stretch>
+        </p:blipFill>
+        <p:spPr>
+          <a:xfrm>
+            <a:off x="0" y="0"/>
+            <a:ext cx="12192000" cy="7142399"/>
+          </a:xfrm>
+        </p:spPr>
+      </p:pic>
+    </p:spTree>
+    <p:extLst>
+      <p:ext uri="{BB962C8B-B14F-4D97-AF65-F5344CB8AC3E}">
+        <p14:creationId xmlns:p14="http://schemas.microsoft.com/office/powerpoint/2010/main" val="1698571122"/>
+      </p:ext>
+    </p:extLst>
+  </p:cSld>
+  <p:clrMapOvr>
+    <a:masterClrMapping/>
+  </p:clrMapOvr>
+</p:sld>
+</file>
+
+<file path=ppt/slides/slide11.xml><?xml version="1.0" encoding="utf-8"?>
+<p:sld xmlns:a="http://schemas.openxmlformats.org/drawingml/2006/main" xmlns:r="http://schemas.openxmlformats.org/officeDocument/2006/relationships" xmlns:p="http://schemas.openxmlformats.org/presentationml/2006/main" showMasterSp="0">
+  <p:cSld>
+    <p:bg>
+      <p:bgPr>
+        <a:solidFill>
+          <a:schemeClr val="bg1"/>
+        </a:solidFill>
+        <a:effectLst/>
+      </p:bgPr>
+    </p:bg>
+    <p:spTree>
+      <p:nvGrpSpPr>
+        <p:cNvPr id="1" name=""/>
+        <p:cNvGrpSpPr/>
+        <p:nvPr/>
+      </p:nvGrpSpPr>
+      <p:grpSpPr>
+        <a:xfrm>
+          <a:off x="0" y="0"/>
+          <a:ext cx="0" cy="0"/>
+          <a:chOff x="0" y="0"/>
+          <a:chExt cx="0" cy="0"/>
+        </a:xfrm>
+      </p:grpSpPr>
       <p:pic>
         <p:nvPicPr>
           <p:cNvPr id="5" name="Marcador de contenido 4" descr="Gráfico, Gráfico circular&#10;&#10;Descripción generada automáticamente">
@@ -7838,7 +7929,7 @@
 </p:sld>
 </file>
 
-<file path=ppt/slides/slide11.xml><?xml version="1.0" encoding="utf-8"?>
+<file path=ppt/slides/slide12.xml><?xml version="1.0" encoding="utf-8"?>
 <p:sld xmlns:a="http://schemas.openxmlformats.org/drawingml/2006/main" xmlns:r="http://schemas.openxmlformats.org/officeDocument/2006/relationships" xmlns:p="http://schemas.openxmlformats.org/presentationml/2006/main" showMasterSp="0">
   <p:cSld>
     <p:bg>
@@ -7936,7 +8027,7 @@
 </p:sld>
 </file>
 
-<file path=ppt/slides/slide12.xml><?xml version="1.0" encoding="utf-8"?>
+<file path=ppt/slides/slide13.xml><?xml version="1.0" encoding="utf-8"?>
 <p:sld xmlns:a="http://schemas.openxmlformats.org/drawingml/2006/main" xmlns:r="http://schemas.openxmlformats.org/officeDocument/2006/relationships" xmlns:p="http://schemas.openxmlformats.org/presentationml/2006/main">
   <p:cSld>
     <p:spTree>
@@ -7987,31 +8078,35 @@
           </a:p>
         </p:txBody>
       </p:sp>
-      <p:sp>
-        <p:nvSpPr>
-          <p:cNvPr id="3" name="Marcador de contenido 2">
+      <p:pic>
+        <p:nvPicPr>
+          <p:cNvPr id="5" name="Marcador de contenido 4" descr="Icono&#10;&#10;Descripción generada automáticamente">
             <a:extLst>
               <a:ext uri="{FF2B5EF4-FFF2-40B4-BE49-F238E27FC236}">
-                <a16:creationId xmlns:a16="http://schemas.microsoft.com/office/drawing/2014/main" id="{E9AE7681-0685-469C-A83F-33604DDD587B}"/>
+                <a16:creationId xmlns:a16="http://schemas.microsoft.com/office/drawing/2014/main" id="{4B613EC7-DDC9-4DA4-BE84-742FB63443C9}"/>
               </a:ext>
             </a:extLst>
           </p:cNvPr>
-          <p:cNvSpPr>
-            <a:spLocks noGrp="1"/>
-          </p:cNvSpPr>
+          <p:cNvPicPr>
+            <a:picLocks noGrp="1" noChangeAspect="1"/>
+          </p:cNvPicPr>
           <p:nvPr>
             <p:ph idx="1"/>
           </p:nvPr>
-        </p:nvSpPr>
-        <p:spPr/>
-        <p:txBody>
-          <a:bodyPr/>
-          <a:lstStyle/>
-          <a:p>
-            <a:endParaRPr lang="es-ES" dirty="0"/>
-          </a:p>
-        </p:txBody>
-      </p:sp>
+        </p:nvPicPr>
+        <p:blipFill>
+          <a:blip r:embed="rId2"/>
+          <a:stretch>
+            <a:fillRect/>
+          </a:stretch>
+        </p:blipFill>
+        <p:spPr>
+          <a:xfrm>
+            <a:off x="2820838" y="1352866"/>
+            <a:ext cx="7321537" cy="4881024"/>
+          </a:xfrm>
+        </p:spPr>
+      </p:pic>
     </p:spTree>
     <p:extLst>
       <p:ext uri="{BB962C8B-B14F-4D97-AF65-F5344CB8AC3E}">
@@ -8025,7 +8120,7 @@
 </p:sld>
 </file>
 
-<file path=ppt/slides/slide13.xml><?xml version="1.0" encoding="utf-8"?>
+<file path=ppt/slides/slide14.xml><?xml version="1.0" encoding="utf-8"?>
 <p:sld xmlns:a="http://schemas.openxmlformats.org/drawingml/2006/main" xmlns:r="http://schemas.openxmlformats.org/officeDocument/2006/relationships" xmlns:p="http://schemas.openxmlformats.org/presentationml/2006/main">
   <p:cSld>
     <p:spTree>
@@ -8109,7 +8204,7 @@
 </p:sld>
 </file>
 
-<file path=ppt/slides/slide14.xml><?xml version="1.0" encoding="utf-8"?>
+<file path=ppt/slides/slide15.xml><?xml version="1.0" encoding="utf-8"?>
 <p:sld xmlns:a="http://schemas.openxmlformats.org/drawingml/2006/main" xmlns:r="http://schemas.openxmlformats.org/officeDocument/2006/relationships" xmlns:p="http://schemas.openxmlformats.org/presentationml/2006/main" showMasterSp="0">
   <p:cSld>
     <p:spTree>
@@ -8196,156 +8291,6 @@
 </p:sld>
 </file>
 
-<file path=ppt/slides/slide15.xml><?xml version="1.0" encoding="utf-8"?>
-<p:sld xmlns:a="http://schemas.openxmlformats.org/drawingml/2006/main" xmlns:r="http://schemas.openxmlformats.org/officeDocument/2006/relationships" xmlns:p="http://schemas.openxmlformats.org/presentationml/2006/main">
-  <p:cSld>
-    <p:spTree>
-      <p:nvGrpSpPr>
-        <p:cNvPr id="1" name=""/>
-        <p:cNvGrpSpPr/>
-        <p:nvPr/>
-      </p:nvGrpSpPr>
-      <p:grpSpPr>
-        <a:xfrm>
-          <a:off x="0" y="0"/>
-          <a:ext cx="0" cy="0"/>
-          <a:chOff x="0" y="0"/>
-          <a:chExt cx="0" cy="0"/>
-        </a:xfrm>
-      </p:grpSpPr>
-      <p:sp>
-        <p:nvSpPr>
-          <p:cNvPr id="2" name="Título 1">
-            <a:extLst>
-              <a:ext uri="{FF2B5EF4-FFF2-40B4-BE49-F238E27FC236}">
-                <a16:creationId xmlns:a16="http://schemas.microsoft.com/office/drawing/2014/main" id="{AC0607FC-9786-4B1F-B30E-1B3A921EDA80}"/>
-              </a:ext>
-            </a:extLst>
-          </p:cNvPr>
-          <p:cNvSpPr>
-            <a:spLocks noGrp="1"/>
-          </p:cNvSpPr>
-          <p:nvPr>
-            <p:ph type="title"/>
-          </p:nvPr>
-        </p:nvSpPr>
-        <p:spPr>
-          <a:xfrm>
-            <a:off x="1740126" y="362339"/>
-            <a:ext cx="8911687" cy="1289180"/>
-          </a:xfrm>
-        </p:spPr>
-        <p:txBody>
-          <a:bodyPr>
-            <a:normAutofit/>
-          </a:bodyPr>
-          <a:lstStyle/>
-          <a:p>
-            <a:pPr algn="ctr"/>
-            <a:r>
-              <a:rPr lang="es-ES" sz="4400" dirty="0">
-                <a:solidFill>
-                  <a:srgbClr val="C00000"/>
-                </a:solidFill>
-              </a:rPr>
-              <a:t>CONCLUSIONS</a:t>
-            </a:r>
-          </a:p>
-        </p:txBody>
-      </p:sp>
-      <p:sp>
-        <p:nvSpPr>
-          <p:cNvPr id="3" name="Marcador de contenido 2">
-            <a:extLst>
-              <a:ext uri="{FF2B5EF4-FFF2-40B4-BE49-F238E27FC236}">
-                <a16:creationId xmlns:a16="http://schemas.microsoft.com/office/drawing/2014/main" id="{FD6C9E27-630A-4070-8BE7-8E649A1402F9}"/>
-              </a:ext>
-            </a:extLst>
-          </p:cNvPr>
-          <p:cNvSpPr>
-            <a:spLocks noGrp="1"/>
-          </p:cNvSpPr>
-          <p:nvPr>
-            <p:ph idx="1"/>
-          </p:nvPr>
-        </p:nvSpPr>
-        <p:spPr>
-          <a:xfrm>
-            <a:off x="1740126" y="1240972"/>
-            <a:ext cx="9119785" cy="5458408"/>
-          </a:xfrm>
-        </p:spPr>
-        <p:txBody>
-          <a:bodyPr>
-            <a:normAutofit/>
-          </a:bodyPr>
-          <a:lstStyle/>
-          <a:p>
-            <a:pPr algn="ctr"/>
-            <a:r>
-              <a:rPr lang="es-ES" sz="2400" dirty="0"/>
-              <a:t>THERE IS NO CORRELATION BETWEEN UNEMPLOYMENT AND SUICIDE RATES</a:t>
-            </a:r>
-          </a:p>
-          <a:p>
-            <a:pPr algn="ctr"/>
-            <a:endParaRPr lang="es-ES" dirty="0"/>
-          </a:p>
-          <a:p>
-            <a:pPr algn="ctr"/>
-            <a:r>
-              <a:rPr lang="es-ES" sz="2400" dirty="0"/>
-              <a:t>SUICIDE HITS MALE MORE OFTEN, IN A PROPORTION OF ALMOST 5 TO 1</a:t>
-            </a:r>
-          </a:p>
-          <a:p>
-            <a:pPr algn="ctr"/>
-            <a:endParaRPr lang="es-ES" sz="2400" dirty="0"/>
-          </a:p>
-          <a:p>
-            <a:pPr algn="ctr"/>
-            <a:r>
-              <a:rPr lang="es-ES" sz="2400" dirty="0"/>
-              <a:t>AGE AND UNEMPLOYMENT HAVE A NEGATIVE CORRELATION</a:t>
-            </a:r>
-          </a:p>
-          <a:p>
-            <a:pPr algn="ctr"/>
-            <a:endParaRPr lang="es-ES" sz="2400" dirty="0"/>
-          </a:p>
-          <a:p>
-            <a:pPr algn="ctr"/>
-            <a:r>
-              <a:rPr lang="es-ES" sz="2400" dirty="0"/>
-              <a:t>AGE AND SUICIDE HAVE A POSITIVE CORRELATION</a:t>
-            </a:r>
-          </a:p>
-          <a:p>
-            <a:pPr algn="ctr"/>
-            <a:endParaRPr lang="es-ES" sz="2400" dirty="0"/>
-          </a:p>
-          <a:p>
-            <a:pPr algn="ctr"/>
-            <a:r>
-              <a:rPr lang="es-ES" sz="2400" dirty="0"/>
-              <a:t>UNEMPLOYMENT IS ALMOST EQUAL BETWEEN GENDERS</a:t>
-            </a:r>
-          </a:p>
-        </p:txBody>
-      </p:sp>
-    </p:spTree>
-    <p:extLst>
-      <p:ext uri="{BB962C8B-B14F-4D97-AF65-F5344CB8AC3E}">
-        <p14:creationId xmlns:p14="http://schemas.microsoft.com/office/powerpoint/2010/main" val="2235617193"/>
-      </p:ext>
-    </p:extLst>
-  </p:cSld>
-  <p:clrMapOvr>
-    <a:masterClrMapping/>
-  </p:clrMapOvr>
-</p:sld>
-</file>
-
 <file path=ppt/slides/slide16.xml><?xml version="1.0" encoding="utf-8"?>
 <p:sld xmlns:a="http://schemas.openxmlformats.org/drawingml/2006/main" xmlns:r="http://schemas.openxmlformats.org/officeDocument/2006/relationships" xmlns:p="http://schemas.openxmlformats.org/presentationml/2006/main">
   <p:cSld>
@@ -8368,7 +8313,7 @@
           <p:cNvPr id="2" name="Título 1">
             <a:extLst>
               <a:ext uri="{FF2B5EF4-FFF2-40B4-BE49-F238E27FC236}">
-                <a16:creationId xmlns:a16="http://schemas.microsoft.com/office/drawing/2014/main" id="{A2CDC2AA-2240-42E1-955F-BEE49FD9277E}"/>
+                <a16:creationId xmlns:a16="http://schemas.microsoft.com/office/drawing/2014/main" id="{AC0607FC-9786-4B1F-B30E-1B3A921EDA80}"/>
               </a:ext>
             </a:extLst>
           </p:cNvPr>
@@ -8381,8 +8326,8 @@
         </p:nvSpPr>
         <p:spPr>
           <a:xfrm>
-            <a:off x="1972141" y="377505"/>
-            <a:ext cx="8911687" cy="1280890"/>
+            <a:off x="1740126" y="362339"/>
+            <a:ext cx="8911687" cy="1289180"/>
           </a:xfrm>
         </p:spPr>
         <p:txBody>
@@ -8391,50 +8336,102 @@
           </a:bodyPr>
           <a:lstStyle/>
           <a:p>
+            <a:pPr algn="ctr"/>
             <a:r>
               <a:rPr lang="es-ES" sz="4400" dirty="0">
                 <a:solidFill>
                   <a:srgbClr val="C00000"/>
                 </a:solidFill>
               </a:rPr>
-              <a:t>TIME EFFORT PIECHART</a:t>
-            </a:r>
-          </a:p>
-        </p:txBody>
-      </p:sp>
-      <p:pic>
-        <p:nvPicPr>
-          <p:cNvPr id="5" name="Marcador de contenido 4" descr="Gráfico, Gráfico circular&#10;&#10;Descripción generada automáticamente">
+              <a:t>CONCLUSIONS</a:t>
+            </a:r>
+          </a:p>
+        </p:txBody>
+      </p:sp>
+      <p:sp>
+        <p:nvSpPr>
+          <p:cNvPr id="3" name="Marcador de contenido 2">
             <a:extLst>
               <a:ext uri="{FF2B5EF4-FFF2-40B4-BE49-F238E27FC236}">
-                <a16:creationId xmlns:a16="http://schemas.microsoft.com/office/drawing/2014/main" id="{73EADB8C-5467-421E-A29C-1B0F2C821B75}"/>
+                <a16:creationId xmlns:a16="http://schemas.microsoft.com/office/drawing/2014/main" id="{FD6C9E27-630A-4070-8BE7-8E649A1402F9}"/>
               </a:ext>
             </a:extLst>
           </p:cNvPr>
-          <p:cNvPicPr>
-            <a:picLocks noGrp="1" noChangeAspect="1"/>
-          </p:cNvPicPr>
+          <p:cNvSpPr>
+            <a:spLocks noGrp="1"/>
+          </p:cNvSpPr>
           <p:nvPr>
             <p:ph idx="1"/>
           </p:nvPr>
-        </p:nvPicPr>
-        <p:blipFill>
-          <a:blip r:embed="rId2"/>
-          <a:stretch>
-            <a:fillRect/>
-          </a:stretch>
-        </p:blipFill>
+        </p:nvSpPr>
         <p:spPr>
           <a:xfrm>
-            <a:off x="1972141" y="1464760"/>
-            <a:ext cx="7289306" cy="4762943"/>
+            <a:off x="1740126" y="1240972"/>
+            <a:ext cx="9119785" cy="5458408"/>
           </a:xfrm>
         </p:spPr>
-      </p:pic>
+        <p:txBody>
+          <a:bodyPr>
+            <a:normAutofit/>
+          </a:bodyPr>
+          <a:lstStyle/>
+          <a:p>
+            <a:pPr algn="ctr"/>
+            <a:r>
+              <a:rPr lang="es-ES" sz="2400" dirty="0"/>
+              <a:t>THERE IS NEGATIVE CORRELATION BETWEEN UNEMPLOYMENT AND SUICIDE</a:t>
+            </a:r>
+          </a:p>
+          <a:p>
+            <a:pPr algn="ctr"/>
+            <a:endParaRPr lang="es-ES" dirty="0"/>
+          </a:p>
+          <a:p>
+            <a:pPr algn="ctr"/>
+            <a:r>
+              <a:rPr lang="es-ES" sz="2400" dirty="0"/>
+              <a:t>SUICIDE HITS MALE MORE OFTEN, IN A PROPORTION OF ALMOST 5 TO 1</a:t>
+            </a:r>
+          </a:p>
+          <a:p>
+            <a:pPr algn="ctr"/>
+            <a:endParaRPr lang="es-ES" sz="2400" dirty="0"/>
+          </a:p>
+          <a:p>
+            <a:pPr algn="ctr"/>
+            <a:r>
+              <a:rPr lang="es-ES" sz="2400" dirty="0"/>
+              <a:t>AGE AND UNEMPLOYMENT HAVE A NEGATIVE CORRELATION</a:t>
+            </a:r>
+          </a:p>
+          <a:p>
+            <a:pPr algn="ctr"/>
+            <a:endParaRPr lang="es-ES" sz="2400" dirty="0"/>
+          </a:p>
+          <a:p>
+            <a:pPr algn="ctr"/>
+            <a:r>
+              <a:rPr lang="es-ES" sz="2400" dirty="0"/>
+              <a:t>AGE AND SUICIDE HAVE A POSITIVE CORRELATION</a:t>
+            </a:r>
+          </a:p>
+          <a:p>
+            <a:pPr algn="ctr"/>
+            <a:endParaRPr lang="es-ES" sz="2400" dirty="0"/>
+          </a:p>
+          <a:p>
+            <a:pPr algn="ctr"/>
+            <a:r>
+              <a:rPr lang="es-ES" sz="2400" dirty="0"/>
+              <a:t>UNEMPLOYMENT IS ALMOST EQUAL BETWEEN GENDERS</a:t>
+            </a:r>
+          </a:p>
+        </p:txBody>
+      </p:sp>
     </p:spTree>
     <p:extLst>
       <p:ext uri="{BB962C8B-B14F-4D97-AF65-F5344CB8AC3E}">
-        <p14:creationId xmlns:p14="http://schemas.microsoft.com/office/powerpoint/2010/main" val="3039201852"/>
+        <p14:creationId xmlns:p14="http://schemas.microsoft.com/office/powerpoint/2010/main" val="2235617193"/>
       </p:ext>
     </p:extLst>
   </p:cSld>
@@ -8599,86 +8596,6 @@
           <p:cNvPr id="2" name="Título 1">
             <a:extLst>
               <a:ext uri="{FF2B5EF4-FFF2-40B4-BE49-F238E27FC236}">
-                <a16:creationId xmlns:a16="http://schemas.microsoft.com/office/drawing/2014/main" id="{7C6562ED-1F53-4FF2-90A3-DB1E63386AC6}"/>
-              </a:ext>
-            </a:extLst>
-          </p:cNvPr>
-          <p:cNvSpPr>
-            <a:spLocks noGrp="1"/>
-          </p:cNvSpPr>
-          <p:nvPr>
-            <p:ph type="title"/>
-          </p:nvPr>
-        </p:nvSpPr>
-        <p:spPr/>
-        <p:txBody>
-          <a:bodyPr/>
-          <a:lstStyle/>
-          <a:p>
-            <a:endParaRPr lang="es-ES"/>
-          </a:p>
-        </p:txBody>
-      </p:sp>
-      <p:sp>
-        <p:nvSpPr>
-          <p:cNvPr id="3" name="Marcador de contenido 2">
-            <a:extLst>
-              <a:ext uri="{FF2B5EF4-FFF2-40B4-BE49-F238E27FC236}">
-                <a16:creationId xmlns:a16="http://schemas.microsoft.com/office/drawing/2014/main" id="{96B19500-F43E-442F-91E6-7F122E8A164C}"/>
-              </a:ext>
-            </a:extLst>
-          </p:cNvPr>
-          <p:cNvSpPr>
-            <a:spLocks noGrp="1"/>
-          </p:cNvSpPr>
-          <p:nvPr>
-            <p:ph idx="1"/>
-          </p:nvPr>
-        </p:nvSpPr>
-        <p:spPr/>
-        <p:txBody>
-          <a:bodyPr/>
-          <a:lstStyle/>
-          <a:p>
-            <a:endParaRPr lang="es-ES"/>
-          </a:p>
-        </p:txBody>
-      </p:sp>
-    </p:spTree>
-    <p:extLst>
-      <p:ext uri="{BB962C8B-B14F-4D97-AF65-F5344CB8AC3E}">
-        <p14:creationId xmlns:p14="http://schemas.microsoft.com/office/powerpoint/2010/main" val="3132834129"/>
-      </p:ext>
-    </p:extLst>
-  </p:cSld>
-  <p:clrMapOvr>
-    <a:masterClrMapping/>
-  </p:clrMapOvr>
-</p:sld>
-</file>
-
-<file path=ppt/slides/slide19.xml><?xml version="1.0" encoding="utf-8"?>
-<p:sld xmlns:a="http://schemas.openxmlformats.org/drawingml/2006/main" xmlns:r="http://schemas.openxmlformats.org/officeDocument/2006/relationships" xmlns:p="http://schemas.openxmlformats.org/presentationml/2006/main">
-  <p:cSld>
-    <p:spTree>
-      <p:nvGrpSpPr>
-        <p:cNvPr id="1" name=""/>
-        <p:cNvGrpSpPr/>
-        <p:nvPr/>
-      </p:nvGrpSpPr>
-      <p:grpSpPr>
-        <a:xfrm>
-          <a:off x="0" y="0"/>
-          <a:ext cx="0" cy="0"/>
-          <a:chOff x="0" y="0"/>
-          <a:chExt cx="0" cy="0"/>
-        </a:xfrm>
-      </p:grpSpPr>
-      <p:sp>
-        <p:nvSpPr>
-          <p:cNvPr id="2" name="Título 1">
-            <a:extLst>
-              <a:ext uri="{FF2B5EF4-FFF2-40B4-BE49-F238E27FC236}">
                 <a16:creationId xmlns:a16="http://schemas.microsoft.com/office/drawing/2014/main" id="{404F7D84-BF6E-4834-890F-3F1ECE384328}"/>
               </a:ext>
             </a:extLst>
@@ -8767,7 +8684,7 @@
           <a:p>
             <a:r>
               <a:rPr lang="es-ES" dirty="0"/>
-              <a:t>MATPLOTLIB, PLOTLY, SEABORN LIBRARIES (GRAPHIC  REPRESENTATION)</a:t>
+              <a:t>PLOTLY, SEABORN LIBRARIES (GRAPHIC  REPRESENTATION)</a:t>
             </a:r>
           </a:p>
         </p:txBody>
@@ -9314,6 +9231,104 @@
           <p:cNvPr id="2" name="Título 1">
             <a:extLst>
               <a:ext uri="{FF2B5EF4-FFF2-40B4-BE49-F238E27FC236}">
+                <a16:creationId xmlns:a16="http://schemas.microsoft.com/office/drawing/2014/main" id="{A2CDC2AA-2240-42E1-955F-BEE49FD9277E}"/>
+              </a:ext>
+            </a:extLst>
+          </p:cNvPr>
+          <p:cNvSpPr>
+            <a:spLocks noGrp="1"/>
+          </p:cNvSpPr>
+          <p:nvPr>
+            <p:ph type="title"/>
+          </p:nvPr>
+        </p:nvSpPr>
+        <p:spPr>
+          <a:xfrm>
+            <a:off x="1972141" y="377505"/>
+            <a:ext cx="8911687" cy="1280890"/>
+          </a:xfrm>
+        </p:spPr>
+        <p:txBody>
+          <a:bodyPr>
+            <a:normAutofit/>
+          </a:bodyPr>
+          <a:lstStyle/>
+          <a:p>
+            <a:r>
+              <a:rPr lang="es-ES" sz="4400" dirty="0">
+                <a:solidFill>
+                  <a:srgbClr val="C00000"/>
+                </a:solidFill>
+              </a:rPr>
+              <a:t>TIME EFFORT PIECHART</a:t>
+            </a:r>
+          </a:p>
+        </p:txBody>
+      </p:sp>
+      <p:pic>
+        <p:nvPicPr>
+          <p:cNvPr id="5" name="Marcador de contenido 4" descr="Gráfico, Gráfico circular&#10;&#10;Descripción generada automáticamente">
+            <a:extLst>
+              <a:ext uri="{FF2B5EF4-FFF2-40B4-BE49-F238E27FC236}">
+                <a16:creationId xmlns:a16="http://schemas.microsoft.com/office/drawing/2014/main" id="{73EADB8C-5467-421E-A29C-1B0F2C821B75}"/>
+              </a:ext>
+            </a:extLst>
+          </p:cNvPr>
+          <p:cNvPicPr>
+            <a:picLocks noGrp="1" noChangeAspect="1"/>
+          </p:cNvPicPr>
+          <p:nvPr>
+            <p:ph idx="1"/>
+          </p:nvPr>
+        </p:nvPicPr>
+        <p:blipFill>
+          <a:blip r:embed="rId2"/>
+          <a:stretch>
+            <a:fillRect/>
+          </a:stretch>
+        </p:blipFill>
+        <p:spPr>
+          <a:xfrm>
+            <a:off x="1972141" y="1464760"/>
+            <a:ext cx="7289306" cy="4762943"/>
+          </a:xfrm>
+        </p:spPr>
+      </p:pic>
+    </p:spTree>
+    <p:extLst>
+      <p:ext uri="{BB962C8B-B14F-4D97-AF65-F5344CB8AC3E}">
+        <p14:creationId xmlns:p14="http://schemas.microsoft.com/office/powerpoint/2010/main" val="3039201852"/>
+      </p:ext>
+    </p:extLst>
+  </p:cSld>
+  <p:clrMapOvr>
+    <a:masterClrMapping/>
+  </p:clrMapOvr>
+</p:sld>
+</file>
+
+<file path=ppt/slides/slide5.xml><?xml version="1.0" encoding="utf-8"?>
+<p:sld xmlns:a="http://schemas.openxmlformats.org/drawingml/2006/main" xmlns:r="http://schemas.openxmlformats.org/officeDocument/2006/relationships" xmlns:p="http://schemas.openxmlformats.org/presentationml/2006/main">
+  <p:cSld>
+    <p:spTree>
+      <p:nvGrpSpPr>
+        <p:cNvPr id="1" name=""/>
+        <p:cNvGrpSpPr/>
+        <p:nvPr/>
+      </p:nvGrpSpPr>
+      <p:grpSpPr>
+        <a:xfrm>
+          <a:off x="0" y="0"/>
+          <a:ext cx="0" cy="0"/>
+          <a:chOff x="0" y="0"/>
+          <a:chExt cx="0" cy="0"/>
+        </a:xfrm>
+      </p:grpSpPr>
+      <p:sp>
+        <p:nvSpPr>
+          <p:cNvPr id="2" name="Título 1">
+            <a:extLst>
+              <a:ext uri="{FF2B5EF4-FFF2-40B4-BE49-F238E27FC236}">
                 <a16:creationId xmlns:a16="http://schemas.microsoft.com/office/drawing/2014/main" id="{67614EC4-8836-42E4-ACF1-137CBFA8E2B2}"/>
               </a:ext>
             </a:extLst>
@@ -9385,7 +9400,7 @@
 </p:sld>
 </file>
 
-<file path=ppt/slides/slide5.xml><?xml version="1.0" encoding="utf-8"?>
+<file path=ppt/slides/slide6.xml><?xml version="1.0" encoding="utf-8"?>
 <p:sld xmlns:a="http://schemas.openxmlformats.org/drawingml/2006/main" xmlns:r="http://schemas.openxmlformats.org/officeDocument/2006/relationships" xmlns:p="http://schemas.openxmlformats.org/presentationml/2006/main" showMasterSp="0">
   <p:cSld>
     <p:bg>
@@ -9412,10 +9427,10 @@
       </p:grpSpPr>
       <p:pic>
         <p:nvPicPr>
-          <p:cNvPr id="8" name="Imagen 7" descr="Gráfico, Histograma&#10;&#10;Descripción generada automáticamente">
+          <p:cNvPr id="3" name="Imagen 2" descr="Gráfico, Histograma&#10;&#10;Descripción generada automáticamente">
             <a:extLst>
               <a:ext uri="{FF2B5EF4-FFF2-40B4-BE49-F238E27FC236}">
-                <a16:creationId xmlns:a16="http://schemas.microsoft.com/office/drawing/2014/main" id="{4166D53A-FF39-404E-AE0A-CE1168C5E8E2}"/>
+                <a16:creationId xmlns:a16="http://schemas.microsoft.com/office/drawing/2014/main" id="{0715EA7B-230E-485B-9308-09B86055FBB5}"/>
               </a:ext>
             </a:extLst>
           </p:cNvPr>
@@ -9432,8 +9447,8 @@
         </p:blipFill>
         <p:spPr>
           <a:xfrm>
-            <a:off x="0" y="-630401"/>
-            <a:ext cx="12192000" cy="7684344"/>
+            <a:off x="0" y="-1"/>
+            <a:ext cx="12192000" cy="7063275"/>
           </a:xfrm>
           <a:prstGeom prst="rect">
             <a:avLst/>
@@ -9453,7 +9468,7 @@
 </p:sld>
 </file>
 
-<file path=ppt/slides/slide6.xml><?xml version="1.0" encoding="utf-8"?>
+<file path=ppt/slides/slide7.xml><?xml version="1.0" encoding="utf-8"?>
 <p:sld xmlns:a="http://schemas.openxmlformats.org/drawingml/2006/main" xmlns:r="http://schemas.openxmlformats.org/officeDocument/2006/relationships" xmlns:p="http://schemas.openxmlformats.org/presentationml/2006/main" showMasterSp="0">
   <p:cSld>
     <p:bg>
@@ -9535,7 +9550,7 @@
 </p:sld>
 </file>
 
-<file path=ppt/slides/slide7.xml><?xml version="1.0" encoding="utf-8"?>
+<file path=ppt/slides/slide8.xml><?xml version="1.0" encoding="utf-8"?>
 <p:sld xmlns:a="http://schemas.openxmlformats.org/drawingml/2006/main" xmlns:r="http://schemas.openxmlformats.org/officeDocument/2006/relationships" xmlns:p="http://schemas.openxmlformats.org/presentationml/2006/main" showMasterSp="0">
   <p:cSld>
     <p:bg>
@@ -9634,7 +9649,7 @@
 </p:sld>
 </file>
 
-<file path=ppt/slides/slide8.xml><?xml version="1.0" encoding="utf-8"?>
+<file path=ppt/slides/slide9.xml><?xml version="1.0" encoding="utf-8"?>
 <p:sld xmlns:a="http://schemas.openxmlformats.org/drawingml/2006/main" xmlns:r="http://schemas.openxmlformats.org/officeDocument/2006/relationships" xmlns:p="http://schemas.openxmlformats.org/presentationml/2006/main">
   <p:cSld>
     <p:spTree>
@@ -9723,98 +9738,6 @@
     <p:extLst>
       <p:ext uri="{BB962C8B-B14F-4D97-AF65-F5344CB8AC3E}">
         <p14:creationId xmlns:p14="http://schemas.microsoft.com/office/powerpoint/2010/main" val="2973332114"/>
-      </p:ext>
-    </p:extLst>
-  </p:cSld>
-  <p:clrMapOvr>
-    <a:masterClrMapping/>
-  </p:clrMapOvr>
-</p:sld>
-</file>
-
-<file path=ppt/slides/slide9.xml><?xml version="1.0" encoding="utf-8"?>
-<p:sld xmlns:a="http://schemas.openxmlformats.org/drawingml/2006/main" xmlns:r="http://schemas.openxmlformats.org/officeDocument/2006/relationships" xmlns:p="http://schemas.openxmlformats.org/presentationml/2006/main" showMasterSp="0">
-  <p:cSld>
-    <p:bg>
-      <p:bgPr>
-        <a:solidFill>
-          <a:schemeClr val="bg1"/>
-        </a:solidFill>
-        <a:effectLst/>
-      </p:bgPr>
-    </p:bg>
-    <p:spTree>
-      <p:nvGrpSpPr>
-        <p:cNvPr id="1" name=""/>
-        <p:cNvGrpSpPr/>
-        <p:nvPr/>
-      </p:nvGrpSpPr>
-      <p:grpSpPr>
-        <a:xfrm>
-          <a:off x="0" y="0"/>
-          <a:ext cx="0" cy="0"/>
-          <a:chOff x="0" y="0"/>
-          <a:chExt cx="0" cy="0"/>
-        </a:xfrm>
-      </p:grpSpPr>
-      <p:sp>
-        <p:nvSpPr>
-          <p:cNvPr id="2" name="Título 1">
-            <a:extLst>
-              <a:ext uri="{FF2B5EF4-FFF2-40B4-BE49-F238E27FC236}">
-                <a16:creationId xmlns:a16="http://schemas.microsoft.com/office/drawing/2014/main" id="{C4F6810E-6088-456B-AC40-E826204B452B}"/>
-              </a:ext>
-            </a:extLst>
-          </p:cNvPr>
-          <p:cNvSpPr>
-            <a:spLocks noGrp="1"/>
-          </p:cNvSpPr>
-          <p:nvPr>
-            <p:ph type="title"/>
-          </p:nvPr>
-        </p:nvSpPr>
-        <p:spPr/>
-        <p:txBody>
-          <a:bodyPr/>
-          <a:lstStyle/>
-          <a:p>
-            <a:endParaRPr lang="es-ES" dirty="0"/>
-          </a:p>
-        </p:txBody>
-      </p:sp>
-      <p:pic>
-        <p:nvPicPr>
-          <p:cNvPr id="6" name="Marcador de contenido 5" descr="Gráfico, Histograma&#10;&#10;Descripción generada automáticamente">
-            <a:extLst>
-              <a:ext uri="{FF2B5EF4-FFF2-40B4-BE49-F238E27FC236}">
-                <a16:creationId xmlns:a16="http://schemas.microsoft.com/office/drawing/2014/main" id="{3C96AF1D-4473-4E02-B1C0-962861C62FF1}"/>
-              </a:ext>
-            </a:extLst>
-          </p:cNvPr>
-          <p:cNvPicPr>
-            <a:picLocks noGrp="1" noChangeAspect="1"/>
-          </p:cNvPicPr>
-          <p:nvPr>
-            <p:ph idx="1"/>
-          </p:nvPr>
-        </p:nvPicPr>
-        <p:blipFill>
-          <a:blip r:embed="rId2"/>
-          <a:stretch>
-            <a:fillRect/>
-          </a:stretch>
-        </p:blipFill>
-        <p:spPr>
-          <a:xfrm>
-            <a:off x="0" y="-630000"/>
-            <a:ext cx="12192000" cy="7772400"/>
-          </a:xfrm>
-        </p:spPr>
-      </p:pic>
-    </p:spTree>
-    <p:extLst>
-      <p:ext uri="{BB962C8B-B14F-4D97-AF65-F5344CB8AC3E}">
-        <p14:creationId xmlns:p14="http://schemas.microsoft.com/office/powerpoint/2010/main" val="1698571122"/>
       </p:ext>
     </p:extLst>
   </p:cSld>

</xml_diff>